<commit_message>
:wrench: add function and modified ppt
</commit_message>
<xml_diff>
--- a/aPlatform/aPlatform/portfolio_README.pptx
+++ b/aPlatform/aPlatform/portfolio_README.pptx
@@ -4219,7 +4219,7 @@
           <a:p>
             <a:fld id="{9FE7A9D4-2312-4C80-955C-3A7FA2F8832A}" type="datetimeFigureOut">
               <a:rPr lang="ko-KR" altLang="en-US" smtClean="0"/>
-              <a:t>2022-05-04</a:t>
+              <a:t>2022-06-24</a:t>
             </a:fld>
             <a:endParaRPr lang="ko-KR" altLang="en-US"/>
           </a:p>
@@ -4519,7 +4519,7 @@
           <a:p>
             <a:fld id="{9FE7A9D4-2312-4C80-955C-3A7FA2F8832A}" type="datetimeFigureOut">
               <a:rPr lang="ko-KR" altLang="en-US" smtClean="0"/>
-              <a:t>2022-05-04</a:t>
+              <a:t>2022-06-24</a:t>
             </a:fld>
             <a:endParaRPr lang="ko-KR" altLang="en-US"/>
           </a:p>
@@ -4729,7 +4729,7 @@
           <a:p>
             <a:fld id="{9FE7A9D4-2312-4C80-955C-3A7FA2F8832A}" type="datetimeFigureOut">
               <a:rPr lang="ko-KR" altLang="en-US" smtClean="0"/>
-              <a:t>2022-05-04</a:t>
+              <a:t>2022-06-24</a:t>
             </a:fld>
             <a:endParaRPr lang="ko-KR" altLang="en-US"/>
           </a:p>
@@ -4949,7 +4949,7 @@
           <a:p>
             <a:fld id="{9FE7A9D4-2312-4C80-955C-3A7FA2F8832A}" type="datetimeFigureOut">
               <a:rPr lang="ko-KR" altLang="en-US" smtClean="0"/>
-              <a:t>2022-05-04</a:t>
+              <a:t>2022-06-24</a:t>
             </a:fld>
             <a:endParaRPr lang="ko-KR" altLang="en-US"/>
           </a:p>
@@ -5159,7 +5159,7 @@
           <a:p>
             <a:fld id="{9FE7A9D4-2312-4C80-955C-3A7FA2F8832A}" type="datetimeFigureOut">
               <a:rPr lang="ko-KR" altLang="en-US" smtClean="0"/>
-              <a:t>2022-05-04</a:t>
+              <a:t>2022-06-24</a:t>
             </a:fld>
             <a:endParaRPr lang="ko-KR" altLang="en-US"/>
           </a:p>
@@ -5446,7 +5446,7 @@
           <a:p>
             <a:fld id="{9FE7A9D4-2312-4C80-955C-3A7FA2F8832A}" type="datetimeFigureOut">
               <a:rPr lang="ko-KR" altLang="en-US" smtClean="0"/>
-              <a:t>2022-05-04</a:t>
+              <a:t>2022-06-24</a:t>
             </a:fld>
             <a:endParaRPr lang="ko-KR" altLang="en-US"/>
           </a:p>
@@ -5723,7 +5723,7 @@
           <a:p>
             <a:fld id="{9FE7A9D4-2312-4C80-955C-3A7FA2F8832A}" type="datetimeFigureOut">
               <a:rPr lang="ko-KR" altLang="en-US" smtClean="0"/>
-              <a:t>2022-05-04</a:t>
+              <a:t>2022-06-24</a:t>
             </a:fld>
             <a:endParaRPr lang="ko-KR" altLang="en-US"/>
           </a:p>
@@ -6147,7 +6147,7 @@
           <a:p>
             <a:fld id="{9FE7A9D4-2312-4C80-955C-3A7FA2F8832A}" type="datetimeFigureOut">
               <a:rPr lang="ko-KR" altLang="en-US" smtClean="0"/>
-              <a:t>2022-05-04</a:t>
+              <a:t>2022-06-24</a:t>
             </a:fld>
             <a:endParaRPr lang="ko-KR" altLang="en-US"/>
           </a:p>
@@ -6300,7 +6300,7 @@
           <a:p>
             <a:fld id="{9FE7A9D4-2312-4C80-955C-3A7FA2F8832A}" type="datetimeFigureOut">
               <a:rPr lang="ko-KR" altLang="en-US" smtClean="0"/>
-              <a:t>2022-05-04</a:t>
+              <a:t>2022-06-24</a:t>
             </a:fld>
             <a:endParaRPr lang="ko-KR" altLang="en-US"/>
           </a:p>
@@ -6514,7 +6514,7 @@
           <a:p>
             <a:fld id="{9FE7A9D4-2312-4C80-955C-3A7FA2F8832A}" type="datetimeFigureOut">
               <a:rPr lang="ko-KR" altLang="en-US" smtClean="0"/>
-              <a:t>2022-05-04</a:t>
+              <a:t>2022-06-24</a:t>
             </a:fld>
             <a:endParaRPr lang="ko-KR" altLang="en-US"/>
           </a:p>
@@ -6728,7 +6728,7 @@
           <a:p>
             <a:fld id="{9FE7A9D4-2312-4C80-955C-3A7FA2F8832A}" type="datetimeFigureOut">
               <a:rPr lang="ko-KR" altLang="en-US" smtClean="0"/>
-              <a:t>2022-05-04</a:t>
+              <a:t>2022-06-24</a:t>
             </a:fld>
             <a:endParaRPr lang="ko-KR" altLang="en-US"/>
           </a:p>
@@ -7051,7 +7051,7 @@
           <a:p>
             <a:fld id="{9FE7A9D4-2312-4C80-955C-3A7FA2F8832A}" type="datetimeFigureOut">
               <a:rPr lang="ko-KR" altLang="en-US" smtClean="0"/>
-              <a:t>2022-05-04</a:t>
+              <a:t>2022-06-24</a:t>
             </a:fld>
             <a:endParaRPr lang="ko-KR" altLang="en-US"/>
           </a:p>
@@ -7304,7 +7304,7 @@
           <a:p>
             <a:fld id="{9FE7A9D4-2312-4C80-955C-3A7FA2F8832A}" type="datetimeFigureOut">
               <a:rPr lang="ko-KR" altLang="en-US" smtClean="0"/>
-              <a:t>2022-05-04</a:t>
+              <a:t>2022-06-24</a:t>
             </a:fld>
             <a:endParaRPr lang="ko-KR" altLang="en-US"/>
           </a:p>
@@ -8093,7 +8093,7 @@
         </p:blipFill>
         <p:spPr>
           <a:xfrm>
-            <a:off x="3590925" y="1924050"/>
+            <a:off x="1000125" y="601174"/>
             <a:ext cx="5010150" cy="3009900"/>
           </a:xfrm>
           <a:prstGeom prst="rect">
@@ -8123,7 +8123,7 @@
         </p:blipFill>
         <p:spPr>
           <a:xfrm>
-            <a:off x="2574802" y="3180251"/>
+            <a:off x="6010275" y="567836"/>
             <a:ext cx="4619625" cy="3076575"/>
           </a:xfrm>
           <a:prstGeom prst="rect">
@@ -8285,7 +8285,7 @@
         </p:blipFill>
         <p:spPr>
           <a:xfrm>
-            <a:off x="2814637" y="1171575"/>
+            <a:off x="2890837" y="1428750"/>
             <a:ext cx="6562725" cy="4514850"/>
           </a:xfrm>
           <a:prstGeom prst="rect">
@@ -8637,12 +8637,12 @@
           <a:p>
             <a:pPr algn="ctr"/>
             <a:r>
-              <a:rPr lang="en-US" altLang="ko-KR" sz="1800" dirty="0">
+              <a:rPr lang="en-US" altLang="ko-KR" sz="1800">
                 <a:solidFill>
                   <a:schemeClr val="bg1"/>
                 </a:solidFill>
               </a:rPr>
-              <a:t>Winter Dream</a:t>
+              <a:t>_a_Finance</a:t>
             </a:r>
             <a:endParaRPr lang="ko-KR" altLang="en-US" sz="1800" dirty="0">
               <a:solidFill>
@@ -8666,8 +8666,8 @@
         </p:nvSpPr>
         <p:spPr>
           <a:xfrm>
-            <a:off x="5122015" y="2824480"/>
-            <a:ext cx="1947969" cy="369332"/>
+            <a:off x="5542001" y="2824480"/>
+            <a:ext cx="1107996" cy="369332"/>
           </a:xfrm>
           <a:prstGeom prst="rect">
             <a:avLst/>
@@ -8682,13 +8682,18 @@
           <a:p>
             <a:pPr algn="ctr"/>
             <a:r>
-              <a:rPr lang="ko-KR" altLang="en-US" dirty="0">
+              <a:rPr lang="ko-KR" altLang="en-US">
                 <a:solidFill>
                   <a:schemeClr val="bg1"/>
                 </a:solidFill>
               </a:rPr>
-              <a:t>성큼 다가온 겨울</a:t>
-            </a:r>
+              <a:t>주식정보</a:t>
+            </a:r>
+            <a:endParaRPr lang="en-US" altLang="ko-KR">
+              <a:solidFill>
+                <a:schemeClr val="bg1"/>
+              </a:solidFill>
+            </a:endParaRPr>
           </a:p>
         </p:txBody>
       </p:sp>
@@ -8742,53 +8747,6 @@
           <a:p>
             <a:pPr algn="ctr"/>
             <a:endParaRPr lang="ko-KR" altLang="en-US"/>
-          </a:p>
-        </p:txBody>
-      </p:sp>
-      <p:sp>
-        <p:nvSpPr>
-          <p:cNvPr id="6" name="TextBox 5">
-            <a:extLst>
-              <a:ext uri="{FF2B5EF4-FFF2-40B4-BE49-F238E27FC236}">
-                <a16:creationId xmlns:a16="http://schemas.microsoft.com/office/drawing/2014/main" id="{99A3A4B1-78DD-4F9A-807D-7BC51AFF4B1A}"/>
-              </a:ext>
-            </a:extLst>
-          </p:cNvPr>
-          <p:cNvSpPr txBox="1"/>
-          <p:nvPr/>
-        </p:nvSpPr>
-        <p:spPr>
-          <a:xfrm>
-            <a:off x="182880" y="193040"/>
-            <a:ext cx="1832553" cy="338554"/>
-          </a:xfrm>
-          <a:prstGeom prst="rect">
-            <a:avLst/>
-          </a:prstGeom>
-          <a:noFill/>
-        </p:spPr>
-        <p:txBody>
-          <a:bodyPr wrap="none" rtlCol="0">
-            <a:spAutoFit/>
-          </a:bodyPr>
-          <a:lstStyle/>
-          <a:p>
-            <a:r>
-              <a:rPr lang="ko-KR" altLang="en-US" sz="1600" dirty="0" err="1">
-                <a:solidFill>
-                  <a:schemeClr val="bg1"/>
-                </a:solidFill>
-              </a:rPr>
-              <a:t>새별의</a:t>
-            </a:r>
-            <a:r>
-              <a:rPr lang="ko-KR" altLang="en-US" sz="1600" dirty="0">
-                <a:solidFill>
-                  <a:schemeClr val="bg1"/>
-                </a:solidFill>
-              </a:rPr>
-              <a:t> 파워포인트</a:t>
-            </a:r>
           </a:p>
         </p:txBody>
       </p:sp>
@@ -33103,7 +33061,7 @@
           <p:spPr>
             <a:xfrm>
               <a:off x="2448562" y="2034550"/>
-              <a:ext cx="2930610" cy="523220"/>
+              <a:ext cx="1620957" cy="523220"/>
             </a:xfrm>
             <a:prstGeom prst="rect">
               <a:avLst/>
@@ -33117,20 +33075,12 @@
             <a:lstStyle/>
             <a:p>
               <a:r>
-                <a:rPr lang="ko-KR" altLang="en-US" sz="2800" dirty="0">
+                <a:rPr lang="ko-KR" altLang="en-US" sz="2800">
                   <a:solidFill>
                     <a:schemeClr val="bg1"/>
                   </a:solidFill>
                 </a:rPr>
-                <a:t>이런 점이 좋아요</a:t>
-              </a:r>
-              <a:r>
-                <a:rPr lang="en-US" altLang="ko-KR" sz="2800" dirty="0">
-                  <a:solidFill>
-                    <a:schemeClr val="bg1"/>
-                  </a:solidFill>
-                </a:rPr>
-                <a:t>!</a:t>
+                <a:t>주식정보</a:t>
               </a:r>
               <a:endParaRPr lang="ko-KR" altLang="en-US" sz="2800" dirty="0">
                 <a:solidFill>
@@ -33155,7 +33105,7 @@
           <p:spPr>
             <a:xfrm>
               <a:off x="985520" y="3114603"/>
-              <a:ext cx="4561840" cy="2068964"/>
+              <a:ext cx="4561840" cy="402546"/>
             </a:xfrm>
             <a:prstGeom prst="rect">
               <a:avLst/>
@@ -33173,150 +33123,6 @@
                   <a:spcPct val="120000"/>
                 </a:lnSpc>
               </a:pPr>
-              <a:r>
-                <a:rPr lang="ko-KR" altLang="en-US" dirty="0">
-                  <a:solidFill>
-                    <a:schemeClr val="bg1"/>
-                  </a:solidFill>
-                </a:rPr>
-                <a:t>이름자를 어머니</a:t>
-              </a:r>
-              <a:r>
-                <a:rPr lang="en-US" altLang="ko-KR" dirty="0">
-                  <a:solidFill>
-                    <a:schemeClr val="bg1"/>
-                  </a:solidFill>
-                </a:rPr>
-                <a:t>, </a:t>
-              </a:r>
-              <a:r>
-                <a:rPr lang="ko-KR" altLang="en-US" dirty="0">
-                  <a:solidFill>
-                    <a:schemeClr val="bg1"/>
-                  </a:solidFill>
-                </a:rPr>
-                <a:t>위에 별 나의 것은 계절이 버리었습니다</a:t>
-              </a:r>
-              <a:r>
-                <a:rPr lang="en-US" altLang="ko-KR" dirty="0">
-                  <a:solidFill>
-                    <a:schemeClr val="bg1"/>
-                  </a:solidFill>
-                </a:rPr>
-                <a:t>. </a:t>
-              </a:r>
-              <a:r>
-                <a:rPr lang="ko-KR" altLang="en-US" dirty="0">
-                  <a:solidFill>
-                    <a:schemeClr val="bg1"/>
-                  </a:solidFill>
-                </a:rPr>
-                <a:t>나는 써 하나에 그리고 동경과 가을로 멀듯이</a:t>
-              </a:r>
-              <a:r>
-                <a:rPr lang="en-US" altLang="ko-KR" dirty="0">
-                  <a:solidFill>
-                    <a:schemeClr val="bg1"/>
-                  </a:solidFill>
-                </a:rPr>
-                <a:t>, </a:t>
-              </a:r>
-              <a:r>
-                <a:rPr lang="ko-KR" altLang="en-US" dirty="0">
-                  <a:solidFill>
-                    <a:schemeClr val="bg1"/>
-                  </a:solidFill>
-                </a:rPr>
-                <a:t>계십니다</a:t>
-              </a:r>
-              <a:r>
-                <a:rPr lang="en-US" altLang="ko-KR" dirty="0">
-                  <a:solidFill>
-                    <a:schemeClr val="bg1"/>
-                  </a:solidFill>
-                </a:rPr>
-                <a:t>. </a:t>
-              </a:r>
-              <a:r>
-                <a:rPr lang="ko-KR" altLang="en-US" dirty="0">
-                  <a:solidFill>
-                    <a:schemeClr val="bg1"/>
-                  </a:solidFill>
-                </a:rPr>
-                <a:t>위에 이네들은 가득 까닭입니다</a:t>
-              </a:r>
-              <a:r>
-                <a:rPr lang="en-US" altLang="ko-KR" dirty="0">
-                  <a:solidFill>
-                    <a:schemeClr val="bg1"/>
-                  </a:solidFill>
-                </a:rPr>
-                <a:t>. </a:t>
-              </a:r>
-              <a:r>
-                <a:rPr lang="ko-KR" altLang="en-US" dirty="0">
-                  <a:solidFill>
-                    <a:schemeClr val="bg1"/>
-                  </a:solidFill>
-                </a:rPr>
-                <a:t>못 피어나듯이 아름다운 부끄러운 지나가는 잠</a:t>
-              </a:r>
-              <a:r>
-                <a:rPr lang="en-US" altLang="ko-KR" dirty="0">
-                  <a:solidFill>
-                    <a:schemeClr val="bg1"/>
-                  </a:solidFill>
-                </a:rPr>
-                <a:t>, </a:t>
-              </a:r>
-              <a:r>
-                <a:rPr lang="ko-KR" altLang="en-US" dirty="0">
-                  <a:solidFill>
-                    <a:schemeClr val="bg1"/>
-                  </a:solidFill>
-                </a:rPr>
-                <a:t>봅니다</a:t>
-              </a:r>
-              <a:r>
-                <a:rPr lang="en-US" altLang="ko-KR" dirty="0">
-                  <a:solidFill>
-                    <a:schemeClr val="bg1"/>
-                  </a:solidFill>
-                </a:rPr>
-                <a:t>. </a:t>
-              </a:r>
-              <a:r>
-                <a:rPr lang="ko-KR" altLang="en-US" dirty="0">
-                  <a:solidFill>
-                    <a:schemeClr val="bg1"/>
-                  </a:solidFill>
-                </a:rPr>
-                <a:t>이름과</a:t>
-              </a:r>
-              <a:r>
-                <a:rPr lang="en-US" altLang="ko-KR" dirty="0">
-                  <a:solidFill>
-                    <a:schemeClr val="bg1"/>
-                  </a:solidFill>
-                </a:rPr>
-                <a:t>, </a:t>
-              </a:r>
-              <a:r>
-                <a:rPr lang="ko-KR" altLang="en-US" dirty="0">
-                  <a:solidFill>
-                    <a:schemeClr val="bg1"/>
-                  </a:solidFill>
-                </a:rPr>
-                <a:t>가을 별 아름다운 흙으로 별빛이 봅니다</a:t>
-              </a:r>
-              <a:r>
-                <a:rPr lang="en-US" altLang="ko-KR" dirty="0">
-                  <a:solidFill>
-                    <a:schemeClr val="bg1"/>
-                  </a:solidFill>
-                </a:rPr>
-                <a:t>.</a:t>
-              </a:r>
               <a:endParaRPr lang="ko-KR" altLang="en-US" dirty="0">
                 <a:solidFill>
                   <a:schemeClr val="bg1"/>
@@ -33326,6 +33132,145 @@
           </p:txBody>
         </p:sp>
       </p:grpSp>
+      <p:sp>
+        <p:nvSpPr>
+          <p:cNvPr id="14" name="TextBox 13">
+            <a:extLst>
+              <a:ext uri="{FF2B5EF4-FFF2-40B4-BE49-F238E27FC236}">
+                <a16:creationId xmlns:a16="http://schemas.microsoft.com/office/drawing/2014/main" id="{A971F022-A8A7-A67A-EA5E-57C2DF2A59B9}"/>
+              </a:ext>
+            </a:extLst>
+          </p:cNvPr>
+          <p:cNvSpPr txBox="1"/>
+          <p:nvPr/>
+        </p:nvSpPr>
+        <p:spPr>
+          <a:xfrm>
+            <a:off x="6627082" y="3114603"/>
+            <a:ext cx="4561840" cy="2064540"/>
+          </a:xfrm>
+          <a:prstGeom prst="rect">
+            <a:avLst/>
+          </a:prstGeom>
+          <a:noFill/>
+        </p:spPr>
+        <p:txBody>
+          <a:bodyPr wrap="square" rtlCol="0">
+            <a:spAutoFit/>
+          </a:bodyPr>
+          <a:lstStyle/>
+          <a:p>
+            <a:pPr marL="285750" indent="-285750" algn="just">
+              <a:lnSpc>
+                <a:spcPct val="120000"/>
+              </a:lnSpc>
+              <a:buFont typeface="Arial" panose="020B0604020202020204" pitchFamily="34" charset="0"/>
+              <a:buChar char="•"/>
+            </a:pPr>
+            <a:r>
+              <a:rPr lang="ko-KR" altLang="en-US">
+                <a:solidFill>
+                  <a:schemeClr val="bg1"/>
+                </a:solidFill>
+              </a:rPr>
+              <a:t>적재적소의 정보들을 출력</a:t>
+            </a:r>
+            <a:endParaRPr lang="en-US" altLang="ko-KR">
+              <a:solidFill>
+                <a:schemeClr val="bg1"/>
+              </a:solidFill>
+            </a:endParaRPr>
+          </a:p>
+          <a:p>
+            <a:pPr marL="285750" indent="-285750" algn="just">
+              <a:lnSpc>
+                <a:spcPct val="120000"/>
+              </a:lnSpc>
+              <a:buFont typeface="Arial" panose="020B0604020202020204" pitchFamily="34" charset="0"/>
+              <a:buChar char="•"/>
+            </a:pPr>
+            <a:r>
+              <a:rPr lang="ko-KR" altLang="en-US">
+                <a:solidFill>
+                  <a:schemeClr val="bg1"/>
+                </a:solidFill>
+              </a:rPr>
+              <a:t>현재 시가총액 순위 출력</a:t>
+            </a:r>
+            <a:endParaRPr lang="en-US" altLang="ko-KR">
+              <a:solidFill>
+                <a:schemeClr val="bg1"/>
+              </a:solidFill>
+            </a:endParaRPr>
+          </a:p>
+          <a:p>
+            <a:pPr marL="285750" indent="-285750" algn="just">
+              <a:lnSpc>
+                <a:spcPct val="120000"/>
+              </a:lnSpc>
+              <a:buFont typeface="Arial" panose="020B0604020202020204" pitchFamily="34" charset="0"/>
+              <a:buChar char="•"/>
+            </a:pPr>
+            <a:r>
+              <a:rPr lang="ko-KR" altLang="en-US">
+                <a:solidFill>
+                  <a:schemeClr val="bg1"/>
+                </a:solidFill>
+              </a:rPr>
+              <a:t>페이지 운영자의 경우 엑셀로 주식현황 최신화 가능</a:t>
+            </a:r>
+            <a:endParaRPr lang="en-US" altLang="ko-KR">
+              <a:solidFill>
+                <a:schemeClr val="bg1"/>
+              </a:solidFill>
+            </a:endParaRPr>
+          </a:p>
+          <a:p>
+            <a:pPr marL="285750" indent="-285750" algn="just">
+              <a:lnSpc>
+                <a:spcPct val="120000"/>
+              </a:lnSpc>
+              <a:buFont typeface="Arial" panose="020B0604020202020204" pitchFamily="34" charset="0"/>
+              <a:buChar char="•"/>
+            </a:pPr>
+            <a:r>
+              <a:rPr lang="ko-KR" altLang="en-US">
+                <a:solidFill>
+                  <a:schemeClr val="bg1"/>
+                </a:solidFill>
+              </a:rPr>
+              <a:t>관심종목기능 </a:t>
+            </a:r>
+            <a:endParaRPr lang="en-US" altLang="ko-KR">
+              <a:solidFill>
+                <a:schemeClr val="bg1"/>
+              </a:solidFill>
+            </a:endParaRPr>
+          </a:p>
+          <a:p>
+            <a:pPr marL="285750" indent="-285750" algn="just">
+              <a:lnSpc>
+                <a:spcPct val="120000"/>
+              </a:lnSpc>
+              <a:buFont typeface="Arial" panose="020B0604020202020204" pitchFamily="34" charset="0"/>
+              <a:buChar char="•"/>
+            </a:pPr>
+            <a:r>
+              <a:rPr lang="ko-KR" altLang="en-US">
+                <a:solidFill>
+                  <a:schemeClr val="bg1"/>
+                </a:solidFill>
+              </a:rPr>
+              <a:t>종목검색으로 세부정보 습득 가능</a:t>
+            </a:r>
+            <a:endParaRPr lang="ko-KR" altLang="en-US" dirty="0">
+              <a:solidFill>
+                <a:schemeClr val="bg1"/>
+              </a:solidFill>
+            </a:endParaRPr>
+          </a:p>
+        </p:txBody>
+      </p:sp>
     </p:spTree>
     <p:extLst>
       <p:ext uri="{BB962C8B-B14F-4D97-AF65-F5344CB8AC3E}">
@@ -33896,13 +33841,13 @@
   <p:clrMapOvr>
     <a:masterClrMapping/>
   </p:clrMapOvr>
-  <mc:AlternateContent xmlns:mc="http://schemas.openxmlformats.org/markup-compatibility/2006">
-    <mc:Choice xmlns:p14="http://schemas.microsoft.com/office/powerpoint/2010/main" Requires="p14">
+  <mc:AlternateContent xmlns:mc="http://schemas.openxmlformats.org/markup-compatibility/2006" xmlns:p14="http://schemas.microsoft.com/office/powerpoint/2010/main">
+    <mc:Choice Requires="p14">
       <p:transition spd="med" p14:dur="700">
         <p:fade/>
       </p:transition>
     </mc:Choice>
-    <mc:Fallback>
+    <mc:Fallback xmlns="">
       <p:transition spd="med">
         <p:fade/>
       </p:transition>

</xml_diff>